<commit_message>
Drop files from .gitignore
</commit_message>
<xml_diff>
--- a/程式說明.pptx
+++ b/程式說明.pptx
@@ -4234,7 +4234,7 @@
           <a:p>
             <a:r>
               <a:rPr lang="en-US" altLang="zh-TW" cap="none" dirty="0"/>
-              <a:t>(a3-0.1.0</a:t>
+              <a:t>(0.1.0.3 </a:t>
             </a:r>
             <a:r>
               <a:rPr lang="zh-TW" altLang="en-US" cap="none" dirty="0"/>
@@ -4545,9 +4545,10 @@
               </a:lnSpc>
             </a:pPr>
             <a:r>
-              <a:rPr lang="en-US" altLang="zh-TW" dirty="0"/>
-              <a:t>a3-0.1.0</a:t>
-            </a:r>
+              <a:rPr lang="en-US" altLang="zh-TW"/>
+              <a:t>[0.1.0.3]</a:t>
+            </a:r>
+            <a:endParaRPr lang="en-US" altLang="zh-TW" dirty="0"/>
           </a:p>
           <a:p>
             <a:pPr lvl="1">
@@ -5119,7 +5120,7 @@
         </p:spPr>
         <p:txBody>
           <a:bodyPr>
-            <a:normAutofit fontScale="92500" lnSpcReduction="20000"/>
+            <a:normAutofit/>
           </a:bodyPr>
           <a:lstStyle/>
           <a:p>
@@ -5229,70 +5230,6 @@
               <a:t>接水點壓力</a:t>
             </a:r>
             <a:endParaRPr lang="en-US" altLang="zh-TW" dirty="0"/>
-          </a:p>
-          <a:p>
-            <a:pPr marL="457200" indent="-457200">
-              <a:lnSpc>
-                <a:spcPct val="160000"/>
-              </a:lnSpc>
-              <a:buFont typeface="+mj-lt"/>
-              <a:buAutoNum type="arabicPeriod"/>
-            </a:pPr>
-            <a:r>
-              <a:rPr lang="zh-TW" altLang="en-US" dirty="0">
-                <a:solidFill>
-                  <a:srgbClr val="FF0000"/>
-                </a:solidFill>
-              </a:rPr>
-              <a:t>水頭損失數值為由單位水頭損失計算而得，成果圖的水頭損失數值可能和直接相減管線</a:t>
-            </a:r>
-            <a:r>
-              <a:rPr lang="en-US" altLang="zh-TW" dirty="0">
-                <a:solidFill>
-                  <a:srgbClr val="FF0000"/>
-                </a:solidFill>
-              </a:rPr>
-              <a:t>2</a:t>
-            </a:r>
-            <a:r>
-              <a:rPr lang="zh-TW" altLang="en-US" dirty="0">
-                <a:solidFill>
-                  <a:srgbClr val="FF0000"/>
-                </a:solidFill>
-              </a:rPr>
-              <a:t>端節點壓力有</a:t>
-            </a:r>
-            <a:r>
-              <a:rPr lang="en-US" altLang="zh-TW" dirty="0">
-                <a:solidFill>
-                  <a:srgbClr val="FF0000"/>
-                </a:solidFill>
-              </a:rPr>
-              <a:t>0.01</a:t>
-            </a:r>
-            <a:r>
-              <a:rPr lang="zh-TW" altLang="en-US" dirty="0">
-                <a:solidFill>
-                  <a:srgbClr val="FF0000"/>
-                </a:solidFill>
-              </a:rPr>
-              <a:t>的誤差</a:t>
-            </a:r>
-            <a:endParaRPr lang="en-US" altLang="zh-TW" dirty="0">
-              <a:solidFill>
-                <a:srgbClr val="FF0000"/>
-              </a:solidFill>
-            </a:endParaRPr>
-          </a:p>
-          <a:p>
-            <a:pPr marL="457200" indent="-457200">
-              <a:lnSpc>
-                <a:spcPct val="160000"/>
-              </a:lnSpc>
-              <a:buFont typeface="+mj-lt"/>
-              <a:buAutoNum type="arabicPeriod"/>
-            </a:pPr>
-            <a:endParaRPr lang="zh-TW" altLang="en-US" dirty="0"/>
           </a:p>
         </p:txBody>
       </p:sp>
@@ -5359,7 +5296,7 @@
         <p:spPr>
           <a:xfrm>
             <a:off x="7741143" y="3560732"/>
-            <a:ext cx="3959403" cy="2636171"/>
+            <a:ext cx="3959403" cy="2636170"/>
           </a:xfrm>
           <a:prstGeom prst="rect">
             <a:avLst/>
@@ -5426,8 +5363,8 @@
         </p:nvSpPr>
         <p:spPr>
           <a:xfrm>
-            <a:off x="8086284" y="1678247"/>
-            <a:ext cx="1483360" cy="369332"/>
+            <a:off x="7838263" y="1889650"/>
+            <a:ext cx="1980001" cy="369332"/>
           </a:xfrm>
           <a:prstGeom prst="rect">
             <a:avLst/>
@@ -5452,7 +5389,7 @@
             </a:r>
             <a:r>
               <a:rPr lang="zh-TW" altLang="en-US" dirty="0"/>
-              <a:t>內容</a:t>
+              <a:t>建模內容</a:t>
             </a:r>
           </a:p>
         </p:txBody>
@@ -5471,7 +5408,7 @@
         </p:nvSpPr>
         <p:spPr>
           <a:xfrm>
-            <a:off x="8086284" y="4680182"/>
+            <a:off x="8086583" y="4891585"/>
             <a:ext cx="1483360" cy="369332"/>
           </a:xfrm>
           <a:prstGeom prst="rect">

</xml_diff>